<commit_message>
Added object diagram to pptx
</commit_message>
<xml_diff>
--- a/Give And Take presentation.pptx
+++ b/Give And Take presentation.pptx
@@ -14,14 +14,15 @@
     <p:sldId id="265" r:id="rId8"/>
     <p:sldId id="275" r:id="rId9"/>
     <p:sldId id="276" r:id="rId10"/>
-    <p:sldId id="267" r:id="rId11"/>
-    <p:sldId id="268" r:id="rId12"/>
-    <p:sldId id="269" r:id="rId13"/>
-    <p:sldId id="270" r:id="rId14"/>
-    <p:sldId id="271" r:id="rId15"/>
-    <p:sldId id="272" r:id="rId16"/>
-    <p:sldId id="273" r:id="rId17"/>
-    <p:sldId id="274" r:id="rId18"/>
+    <p:sldId id="277" r:id="rId11"/>
+    <p:sldId id="267" r:id="rId12"/>
+    <p:sldId id="268" r:id="rId13"/>
+    <p:sldId id="269" r:id="rId14"/>
+    <p:sldId id="270" r:id="rId15"/>
+    <p:sldId id="271" r:id="rId16"/>
+    <p:sldId id="272" r:id="rId17"/>
+    <p:sldId id="273" r:id="rId18"/>
+    <p:sldId id="274" r:id="rId19"/>
   </p:sldIdLst>
   <p:sldSz cx="12192000" cy="6858000"/>
   <p:notesSz cx="6858000" cy="9144000"/>
@@ -18116,6 +18117,532 @@
           <p:cNvPr id="2" name="כותרת 1">
             <a:extLst>
               <a:ext uri="{FF2B5EF4-FFF2-40B4-BE49-F238E27FC236}">
+                <a16:creationId xmlns:a16="http://schemas.microsoft.com/office/drawing/2014/main" id="{9DA801C6-09DE-9549-3656-F9E5728C5770}"/>
+              </a:ext>
+            </a:extLst>
+          </p:cNvPr>
+          <p:cNvSpPr>
+            <a:spLocks noGrp="1"/>
+          </p:cNvSpPr>
+          <p:nvPr>
+            <p:ph type="title"/>
+          </p:nvPr>
+        </p:nvSpPr>
+        <p:spPr/>
+        <p:txBody>
+          <a:bodyPr/>
+          <a:lstStyle/>
+          <a:p>
+            <a:endParaRPr lang="LID4096"/>
+          </a:p>
+        </p:txBody>
+      </p:sp>
+      <p:pic>
+        <p:nvPicPr>
+          <p:cNvPr id="5" name="מציין מיקום תוכן 4">
+            <a:extLst>
+              <a:ext uri="{FF2B5EF4-FFF2-40B4-BE49-F238E27FC236}">
+                <a16:creationId xmlns:a16="http://schemas.microsoft.com/office/drawing/2014/main" id="{47DD5134-81F7-C62E-A92E-12DB5873B378}"/>
+              </a:ext>
+            </a:extLst>
+          </p:cNvPr>
+          <p:cNvPicPr>
+            <a:picLocks noGrp="1" noChangeAspect="1"/>
+          </p:cNvPicPr>
+          <p:nvPr>
+            <p:ph idx="1"/>
+          </p:nvPr>
+        </p:nvPicPr>
+        <p:blipFill>
+          <a:blip r:embed="rId2"/>
+          <a:stretch>
+            <a:fillRect/>
+          </a:stretch>
+        </p:blipFill>
+        <p:spPr>
+          <a:xfrm>
+            <a:off x="0" y="-368559"/>
+            <a:ext cx="11917345" cy="6858000"/>
+          </a:xfrm>
+        </p:spPr>
+      </p:pic>
+      <p:sp>
+        <p:nvSpPr>
+          <p:cNvPr id="8" name="תיבת טקסט 7">
+            <a:extLst>
+              <a:ext uri="{FF2B5EF4-FFF2-40B4-BE49-F238E27FC236}">
+                <a16:creationId xmlns:a16="http://schemas.microsoft.com/office/drawing/2014/main" id="{FCF54B4B-B889-D677-BFEA-E076FEF68074}"/>
+              </a:ext>
+            </a:extLst>
+          </p:cNvPr>
+          <p:cNvSpPr txBox="1"/>
+          <p:nvPr/>
+        </p:nvSpPr>
+        <p:spPr>
+          <a:xfrm>
+            <a:off x="9792071" y="5824698"/>
+            <a:ext cx="2201662" cy="830997"/>
+          </a:xfrm>
+          <a:prstGeom prst="rect">
+            <a:avLst/>
+          </a:prstGeom>
+          <a:noFill/>
+          <a:ln>
+            <a:solidFill>
+              <a:schemeClr val="tx1"/>
+            </a:solidFill>
+          </a:ln>
+        </p:spPr>
+        <p:txBody>
+          <a:bodyPr wrap="square" rtlCol="0">
+            <a:spAutoFit/>
+          </a:bodyPr>
+          <a:lstStyle/>
+          <a:p>
+            <a:r>
+              <a:rPr lang="en-US" sz="1600" u="sng" dirty="0"/>
+              <a:t>Server:</a:t>
+            </a:r>
+            <a:br>
+              <a:rPr lang="en-US" sz="1600" dirty="0"/>
+            </a:br>
+            <a:r>
+              <a:rPr lang="en-US" sz="1600" dirty="0" err="1"/>
+              <a:t>app.post</a:t>
+            </a:r>
+            <a:r>
+              <a:rPr lang="en-US" sz="1600" dirty="0"/>
+              <a:t>(/</a:t>
+            </a:r>
+            <a:r>
+              <a:rPr lang="en-US" sz="1600" dirty="0" err="1"/>
+              <a:t>request_details</a:t>
+            </a:r>
+            <a:r>
+              <a:rPr lang="en-US" sz="1600" dirty="0"/>
+              <a:t>)</a:t>
+            </a:r>
+            <a:endParaRPr lang="LID4096" sz="1600" dirty="0"/>
+          </a:p>
+        </p:txBody>
+      </p:sp>
+      <p:sp>
+        <p:nvSpPr>
+          <p:cNvPr id="9" name="תיבת טקסט 8">
+            <a:extLst>
+              <a:ext uri="{FF2B5EF4-FFF2-40B4-BE49-F238E27FC236}">
+                <a16:creationId xmlns:a16="http://schemas.microsoft.com/office/drawing/2014/main" id="{9B89D067-FD5F-91A4-CB49-2E55E753235D}"/>
+              </a:ext>
+            </a:extLst>
+          </p:cNvPr>
+          <p:cNvSpPr txBox="1"/>
+          <p:nvPr/>
+        </p:nvSpPr>
+        <p:spPr>
+          <a:xfrm>
+            <a:off x="4531360" y="5671066"/>
+            <a:ext cx="3820160" cy="646331"/>
+          </a:xfrm>
+          <a:prstGeom prst="rect">
+            <a:avLst/>
+          </a:prstGeom>
+          <a:solidFill>
+            <a:srgbClr val="660066"/>
+          </a:solidFill>
+        </p:spPr>
+        <p:txBody>
+          <a:bodyPr wrap="square" rtlCol="0">
+            <a:spAutoFit/>
+          </a:bodyPr>
+          <a:lstStyle/>
+          <a:p>
+            <a:r>
+              <a:rPr lang="en-US" sz="3600" dirty="0">
+                <a:solidFill>
+                  <a:schemeClr val="bg1"/>
+                </a:solidFill>
+              </a:rPr>
+              <a:t>System’s objects</a:t>
+            </a:r>
+            <a:endParaRPr lang="LID4096" sz="3600" dirty="0">
+              <a:solidFill>
+                <a:schemeClr val="bg1"/>
+              </a:solidFill>
+            </a:endParaRPr>
+          </a:p>
+        </p:txBody>
+      </p:sp>
+      <p:cxnSp>
+        <p:nvCxnSpPr>
+          <p:cNvPr id="13" name="מחבר חץ ישר 12">
+            <a:extLst>
+              <a:ext uri="{FF2B5EF4-FFF2-40B4-BE49-F238E27FC236}">
+                <a16:creationId xmlns:a16="http://schemas.microsoft.com/office/drawing/2014/main" id="{8B19D9DA-04DC-DF72-2363-AF89F2A2743E}"/>
+              </a:ext>
+            </a:extLst>
+          </p:cNvPr>
+          <p:cNvCxnSpPr>
+            <a:cxnSpLocks/>
+          </p:cNvCxnSpPr>
+          <p:nvPr/>
+        </p:nvCxnSpPr>
+        <p:spPr>
+          <a:xfrm>
+            <a:off x="11180128" y="5078656"/>
+            <a:ext cx="0" cy="744810"/>
+          </a:xfrm>
+          <a:prstGeom prst="straightConnector1">
+            <a:avLst/>
+          </a:prstGeom>
+          <a:ln>
+            <a:tailEnd type="triangle"/>
+          </a:ln>
+        </p:spPr>
+        <p:style>
+          <a:lnRef idx="1">
+            <a:schemeClr val="accent1"/>
+          </a:lnRef>
+          <a:fillRef idx="0">
+            <a:schemeClr val="accent1"/>
+          </a:fillRef>
+          <a:effectRef idx="0">
+            <a:schemeClr val="accent1"/>
+          </a:effectRef>
+          <a:fontRef idx="minor">
+            <a:schemeClr val="tx1"/>
+          </a:fontRef>
+        </p:style>
+      </p:cxnSp>
+      <p:cxnSp>
+        <p:nvCxnSpPr>
+          <p:cNvPr id="15" name="מחבר חץ ישר 14">
+            <a:extLst>
+              <a:ext uri="{FF2B5EF4-FFF2-40B4-BE49-F238E27FC236}">
+                <a16:creationId xmlns:a16="http://schemas.microsoft.com/office/drawing/2014/main" id="{675D51C6-520D-463C-EB8E-606AD3CB3B33}"/>
+              </a:ext>
+            </a:extLst>
+          </p:cNvPr>
+          <p:cNvCxnSpPr>
+            <a:cxnSpLocks/>
+          </p:cNvCxnSpPr>
+          <p:nvPr/>
+        </p:nvCxnSpPr>
+        <p:spPr>
+          <a:xfrm flipH="1">
+            <a:off x="11310857" y="5078656"/>
+            <a:ext cx="499085" cy="744810"/>
+          </a:xfrm>
+          <a:prstGeom prst="straightConnector1">
+            <a:avLst/>
+          </a:prstGeom>
+          <a:ln>
+            <a:tailEnd type="triangle"/>
+          </a:ln>
+        </p:spPr>
+        <p:style>
+          <a:lnRef idx="1">
+            <a:schemeClr val="accent1"/>
+          </a:lnRef>
+          <a:fillRef idx="0">
+            <a:schemeClr val="accent1"/>
+          </a:fillRef>
+          <a:effectRef idx="0">
+            <a:schemeClr val="accent1"/>
+          </a:effectRef>
+          <a:fontRef idx="minor">
+            <a:schemeClr val="tx1"/>
+          </a:fontRef>
+        </p:style>
+      </p:cxnSp>
+      <p:sp>
+        <p:nvSpPr>
+          <p:cNvPr id="17" name="תיבת טקסט 16">
+            <a:extLst>
+              <a:ext uri="{FF2B5EF4-FFF2-40B4-BE49-F238E27FC236}">
+                <a16:creationId xmlns:a16="http://schemas.microsoft.com/office/drawing/2014/main" id="{C5BA14C6-F657-AA45-9B07-A09B0B765F4D}"/>
+              </a:ext>
+            </a:extLst>
+          </p:cNvPr>
+          <p:cNvSpPr txBox="1"/>
+          <p:nvPr/>
+        </p:nvSpPr>
+        <p:spPr>
+          <a:xfrm>
+            <a:off x="10143258" y="4154094"/>
+            <a:ext cx="2048742" cy="923330"/>
+          </a:xfrm>
+          <a:prstGeom prst="rect">
+            <a:avLst/>
+          </a:prstGeom>
+          <a:noFill/>
+        </p:spPr>
+        <p:txBody>
+          <a:bodyPr wrap="square" rtlCol="0">
+            <a:spAutoFit/>
+          </a:bodyPr>
+          <a:lstStyle/>
+          <a:p>
+            <a:pPr algn="ctr"/>
+            <a:r>
+              <a:rPr lang="en-US" dirty="0"/>
+              <a:t>All except models connect to server</a:t>
+            </a:r>
+            <a:endParaRPr lang="LID4096" dirty="0"/>
+          </a:p>
+        </p:txBody>
+      </p:sp>
+      <p:cxnSp>
+        <p:nvCxnSpPr>
+          <p:cNvPr id="18" name="מחבר חץ ישר 17">
+            <a:extLst>
+              <a:ext uri="{FF2B5EF4-FFF2-40B4-BE49-F238E27FC236}">
+                <a16:creationId xmlns:a16="http://schemas.microsoft.com/office/drawing/2014/main" id="{86FCC777-5A27-0F34-9607-E9E5F3B0A6A0}"/>
+              </a:ext>
+            </a:extLst>
+          </p:cNvPr>
+          <p:cNvCxnSpPr/>
+          <p:nvPr/>
+        </p:nvCxnSpPr>
+        <p:spPr>
+          <a:xfrm>
+            <a:off x="10611665" y="5079888"/>
+            <a:ext cx="411982" cy="743578"/>
+          </a:xfrm>
+          <a:prstGeom prst="straightConnector1">
+            <a:avLst/>
+          </a:prstGeom>
+          <a:ln>
+            <a:tailEnd type="triangle"/>
+          </a:ln>
+        </p:spPr>
+        <p:style>
+          <a:lnRef idx="1">
+            <a:schemeClr val="accent1"/>
+          </a:lnRef>
+          <a:fillRef idx="0">
+            <a:schemeClr val="accent1"/>
+          </a:fillRef>
+          <a:effectRef idx="0">
+            <a:schemeClr val="accent1"/>
+          </a:effectRef>
+          <a:fontRef idx="minor">
+            <a:schemeClr val="tx1"/>
+          </a:fontRef>
+        </p:style>
+      </p:cxnSp>
+      <p:sp>
+        <p:nvSpPr>
+          <p:cNvPr id="22" name="תיבת טקסט 21">
+            <a:extLst>
+              <a:ext uri="{FF2B5EF4-FFF2-40B4-BE49-F238E27FC236}">
+                <a16:creationId xmlns:a16="http://schemas.microsoft.com/office/drawing/2014/main" id="{B234C1A2-A0D8-405A-B05F-A6B4AC89FC82}"/>
+              </a:ext>
+            </a:extLst>
+          </p:cNvPr>
+          <p:cNvSpPr txBox="1"/>
+          <p:nvPr/>
+        </p:nvSpPr>
+        <p:spPr>
+          <a:xfrm>
+            <a:off x="10563293" y="2581520"/>
+            <a:ext cx="1369380" cy="646331"/>
+          </a:xfrm>
+          <a:prstGeom prst="rect">
+            <a:avLst/>
+          </a:prstGeom>
+          <a:noFill/>
+          <a:ln>
+            <a:solidFill>
+              <a:schemeClr val="tx1"/>
+            </a:solidFill>
+          </a:ln>
+        </p:spPr>
+        <p:txBody>
+          <a:bodyPr wrap="square">
+            <a:spAutoFit/>
+          </a:bodyPr>
+          <a:lstStyle/>
+          <a:p>
+            <a:r>
+              <a:rPr lang="en-US" sz="1800" u="sng" dirty="0"/>
+              <a:t>Model: </a:t>
+            </a:r>
+            <a:br>
+              <a:rPr lang="en-US" sz="1800" u="sng" dirty="0"/>
+            </a:br>
+            <a:r>
+              <a:rPr lang="en-US" dirty="0"/>
+              <a:t>Request</a:t>
+            </a:r>
+            <a:endParaRPr lang="LID4096" sz="1800" dirty="0"/>
+          </a:p>
+        </p:txBody>
+      </p:sp>
+      <p:cxnSp>
+        <p:nvCxnSpPr>
+          <p:cNvPr id="25" name="מחבר חץ ישר 24">
+            <a:extLst>
+              <a:ext uri="{FF2B5EF4-FFF2-40B4-BE49-F238E27FC236}">
+                <a16:creationId xmlns:a16="http://schemas.microsoft.com/office/drawing/2014/main" id="{2DEF0168-97BB-37BE-005D-F399990E4C7C}"/>
+              </a:ext>
+            </a:extLst>
+          </p:cNvPr>
+          <p:cNvCxnSpPr>
+            <a:cxnSpLocks/>
+          </p:cNvCxnSpPr>
+          <p:nvPr/>
+        </p:nvCxnSpPr>
+        <p:spPr>
+          <a:xfrm flipV="1">
+            <a:off x="9944269" y="3060441"/>
+            <a:ext cx="542636" cy="368559"/>
+          </a:xfrm>
+          <a:prstGeom prst="straightConnector1">
+            <a:avLst/>
+          </a:prstGeom>
+          <a:ln>
+            <a:tailEnd type="triangle"/>
+          </a:ln>
+        </p:spPr>
+        <p:style>
+          <a:lnRef idx="1">
+            <a:schemeClr val="accent1"/>
+          </a:lnRef>
+          <a:fillRef idx="0">
+            <a:schemeClr val="accent1"/>
+          </a:fillRef>
+          <a:effectRef idx="0">
+            <a:schemeClr val="accent1"/>
+          </a:effectRef>
+          <a:fontRef idx="minor">
+            <a:schemeClr val="tx1"/>
+          </a:fontRef>
+        </p:style>
+      </p:cxnSp>
+      <p:sp>
+        <p:nvSpPr>
+          <p:cNvPr id="29" name="תיבת טקסט 28">
+            <a:extLst>
+              <a:ext uri="{FF2B5EF4-FFF2-40B4-BE49-F238E27FC236}">
+                <a16:creationId xmlns:a16="http://schemas.microsoft.com/office/drawing/2014/main" id="{C5022BC7-0C50-60CD-A442-B68B6DD7FF11}"/>
+              </a:ext>
+            </a:extLst>
+          </p:cNvPr>
+          <p:cNvSpPr txBox="1"/>
+          <p:nvPr/>
+        </p:nvSpPr>
+        <p:spPr>
+          <a:xfrm>
+            <a:off x="9268668" y="2009559"/>
+            <a:ext cx="1107478" cy="646331"/>
+          </a:xfrm>
+          <a:prstGeom prst="rect">
+            <a:avLst/>
+          </a:prstGeom>
+          <a:noFill/>
+          <a:ln>
+            <a:solidFill>
+              <a:schemeClr val="tx1"/>
+            </a:solidFill>
+          </a:ln>
+        </p:spPr>
+        <p:txBody>
+          <a:bodyPr wrap="square">
+            <a:spAutoFit/>
+          </a:bodyPr>
+          <a:lstStyle/>
+          <a:p>
+            <a:r>
+              <a:rPr lang="en-US" sz="1800" u="sng" dirty="0"/>
+              <a:t>Model: </a:t>
+            </a:r>
+            <a:br>
+              <a:rPr lang="en-US" sz="1800" u="sng" dirty="0"/>
+            </a:br>
+            <a:r>
+              <a:rPr lang="en-US" dirty="0"/>
+              <a:t>User</a:t>
+            </a:r>
+            <a:endParaRPr lang="LID4096" sz="1800" dirty="0"/>
+          </a:p>
+        </p:txBody>
+      </p:sp>
+      <p:cxnSp>
+        <p:nvCxnSpPr>
+          <p:cNvPr id="30" name="מחבר חץ ישר 29">
+            <a:extLst>
+              <a:ext uri="{FF2B5EF4-FFF2-40B4-BE49-F238E27FC236}">
+                <a16:creationId xmlns:a16="http://schemas.microsoft.com/office/drawing/2014/main" id="{08BF14B6-4BD8-5BE6-B2BC-FEF9DC12E70F}"/>
+              </a:ext>
+            </a:extLst>
+          </p:cNvPr>
+          <p:cNvCxnSpPr>
+            <a:cxnSpLocks/>
+          </p:cNvCxnSpPr>
+          <p:nvPr/>
+        </p:nvCxnSpPr>
+        <p:spPr>
+          <a:xfrm>
+            <a:off x="6223247" y="497150"/>
+            <a:ext cx="3045421" cy="1512409"/>
+          </a:xfrm>
+          <a:prstGeom prst="straightConnector1">
+            <a:avLst/>
+          </a:prstGeom>
+          <a:ln>
+            <a:tailEnd type="triangle"/>
+          </a:ln>
+        </p:spPr>
+        <p:style>
+          <a:lnRef idx="1">
+            <a:schemeClr val="accent1"/>
+          </a:lnRef>
+          <a:fillRef idx="0">
+            <a:schemeClr val="accent1"/>
+          </a:fillRef>
+          <a:effectRef idx="0">
+            <a:schemeClr val="accent1"/>
+          </a:effectRef>
+          <a:fontRef idx="minor">
+            <a:schemeClr val="tx1"/>
+          </a:fontRef>
+        </p:style>
+      </p:cxnSp>
+    </p:spTree>
+    <p:extLst>
+      <p:ext uri="{BB962C8B-B14F-4D97-AF65-F5344CB8AC3E}">
+        <p14:creationId xmlns:p14="http://schemas.microsoft.com/office/powerpoint/2010/main" val="2461157397"/>
+      </p:ext>
+    </p:extLst>
+  </p:cSld>
+  <p:clrMapOvr>
+    <a:masterClrMapping/>
+  </p:clrMapOvr>
+</p:sld>
+</file>
+
+<file path=ppt/slides/slide11.xml><?xml version="1.0" encoding="utf-8"?>
+<p:sld xmlns:a="http://schemas.openxmlformats.org/drawingml/2006/main" xmlns:r="http://schemas.openxmlformats.org/officeDocument/2006/relationships" xmlns:p="http://schemas.openxmlformats.org/presentationml/2006/main">
+  <p:cSld>
+    <p:spTree>
+      <p:nvGrpSpPr>
+        <p:cNvPr id="1" name=""/>
+        <p:cNvGrpSpPr/>
+        <p:nvPr/>
+      </p:nvGrpSpPr>
+      <p:grpSpPr>
+        <a:xfrm>
+          <a:off x="0" y="0"/>
+          <a:ext cx="0" cy="0"/>
+          <a:chOff x="0" y="0"/>
+          <a:chExt cx="0" cy="0"/>
+        </a:xfrm>
+      </p:grpSpPr>
+      <p:sp>
+        <p:nvSpPr>
+          <p:cNvPr id="2" name="כותרת 1">
+            <a:extLst>
+              <a:ext uri="{FF2B5EF4-FFF2-40B4-BE49-F238E27FC236}">
                 <a16:creationId xmlns:a16="http://schemas.microsoft.com/office/drawing/2014/main" id="{298DED83-0B80-453E-84E9-4AF65B7B7759}"/>
               </a:ext>
             </a:extLst>
@@ -18193,7 +18720,7 @@
 </p:sld>
 </file>
 
-<file path=ppt/slides/slide11.xml><?xml version="1.0" encoding="utf-8"?>
+<file path=ppt/slides/slide12.xml><?xml version="1.0" encoding="utf-8"?>
 <p:sld xmlns:a="http://schemas.openxmlformats.org/drawingml/2006/main" xmlns:r="http://schemas.openxmlformats.org/officeDocument/2006/relationships" xmlns:p="http://schemas.openxmlformats.org/presentationml/2006/main">
   <p:cSld>
     <p:spTree>
@@ -18402,7 +18929,7 @@
 </p:sld>
 </file>
 
-<file path=ppt/slides/slide12.xml><?xml version="1.0" encoding="utf-8"?>
+<file path=ppt/slides/slide13.xml><?xml version="1.0" encoding="utf-8"?>
 <p:sld xmlns:a="http://schemas.openxmlformats.org/drawingml/2006/main" xmlns:r="http://schemas.openxmlformats.org/officeDocument/2006/relationships" xmlns:p="http://schemas.openxmlformats.org/presentationml/2006/main">
   <p:cSld>
     <p:spTree>
@@ -18657,7 +19184,7 @@
 </p:sld>
 </file>
 
-<file path=ppt/slides/slide13.xml><?xml version="1.0" encoding="utf-8"?>
+<file path=ppt/slides/slide14.xml><?xml version="1.0" encoding="utf-8"?>
 <p:sld xmlns:a="http://schemas.openxmlformats.org/drawingml/2006/main" xmlns:r="http://schemas.openxmlformats.org/officeDocument/2006/relationships" xmlns:p="http://schemas.openxmlformats.org/presentationml/2006/main">
   <p:cSld>
     <p:spTree>
@@ -18806,7 +19333,7 @@
 </p:sld>
 </file>
 
-<file path=ppt/slides/slide14.xml><?xml version="1.0" encoding="utf-8"?>
+<file path=ppt/slides/slide15.xml><?xml version="1.0" encoding="utf-8"?>
 <p:sld xmlns:a="http://schemas.openxmlformats.org/drawingml/2006/main" xmlns:r="http://schemas.openxmlformats.org/officeDocument/2006/relationships" xmlns:p="http://schemas.openxmlformats.org/presentationml/2006/main">
   <p:cSld>
     <p:spTree>
@@ -18981,7 +19508,7 @@
 </p:sld>
 </file>
 
-<file path=ppt/slides/slide15.xml><?xml version="1.0" encoding="utf-8"?>
+<file path=ppt/slides/slide16.xml><?xml version="1.0" encoding="utf-8"?>
 <p:sld xmlns:a="http://schemas.openxmlformats.org/drawingml/2006/main" xmlns:r="http://schemas.openxmlformats.org/officeDocument/2006/relationships" xmlns:p="http://schemas.openxmlformats.org/presentationml/2006/main">
   <p:cSld>
     <p:spTree>
@@ -19130,7 +19657,7 @@
 </p:sld>
 </file>
 
-<file path=ppt/slides/slide16.xml><?xml version="1.0" encoding="utf-8"?>
+<file path=ppt/slides/slide17.xml><?xml version="1.0" encoding="utf-8"?>
 <p:sld xmlns:a="http://schemas.openxmlformats.org/drawingml/2006/main" xmlns:r="http://schemas.openxmlformats.org/officeDocument/2006/relationships" xmlns:p="http://schemas.openxmlformats.org/presentationml/2006/main">
   <p:cSld>
     <p:spTree>
@@ -19279,7 +19806,7 @@
 </p:sld>
 </file>
 
-<file path=ppt/slides/slide17.xml><?xml version="1.0" encoding="utf-8"?>
+<file path=ppt/slides/slide18.xml><?xml version="1.0" encoding="utf-8"?>
 <p:sld xmlns:a="http://schemas.openxmlformats.org/drawingml/2006/main" xmlns:r="http://schemas.openxmlformats.org/officeDocument/2006/relationships" xmlns:p="http://schemas.openxmlformats.org/presentationml/2006/main">
   <p:cSld>
     <p:spTree>

</xml_diff>